<commit_message>
error handling and email
</commit_message>
<xml_diff>
--- a/src/main/resources/smart/housing/ui/images/iconEditor.pptx
+++ b/src/main/resources/smart/housing/ui/images/iconEditor.pptx
@@ -2,43 +2,45 @@
 <file path=ppt/presentation.xml><?xml version="1.0" encoding="utf-8"?>
 <p:presentation xmlns:a="http://schemas.openxmlformats.org/drawingml/2006/main" xmlns:r="http://schemas.openxmlformats.org/officeDocument/2006/relationships" xmlns:p="http://schemas.openxmlformats.org/presentationml/2006/main" embedTrueTypeFonts="1" autoCompressPictures="0">
   <p:sldMasterIdLst>
-    <p:sldMasterId id="2147483733" r:id="rId8"/>
+    <p:sldMasterId id="2147483733" r:id="rId12"/>
   </p:sldMasterIdLst>
   <p:notesMasterIdLst>
-    <p:notesMasterId r:id="rId11"/>
+    <p:notesMasterId r:id="rId17"/>
   </p:notesMasterIdLst>
   <p:handoutMasterIdLst>
-    <p:handoutMasterId r:id="rId12"/>
+    <p:handoutMasterId r:id="rId18"/>
   </p:handoutMasterIdLst>
   <p:sldIdLst>
-    <p:sldId id="364" r:id="rId9"/>
-    <p:sldId id="365" r:id="rId10"/>
+    <p:sldId id="364" r:id="rId13"/>
+    <p:sldId id="366" r:id="rId14"/>
+    <p:sldId id="367" r:id="rId15"/>
+    <p:sldId id="365" r:id="rId16"/>
   </p:sldIdLst>
   <p:sldSz cx="12195175" cy="6858000"/>
   <p:notesSz cx="6858000" cy="9144000"/>
   <p:embeddedFontLst>
     <p:embeddedFont>
       <p:font typeface="72 Brand" panose="020B0504030603020204" pitchFamily="34" charset="0"/>
-      <p:regular r:id="rId13"/>
-      <p:bold r:id="rId14"/>
-      <p:italic r:id="rId15"/>
-      <p:boldItalic r:id="rId16"/>
-    </p:embeddedFont>
-    <p:embeddedFont>
-      <p:font typeface="72 Brand Medium" panose="020B0604030603020204" pitchFamily="34" charset="0"/>
-      <p:regular r:id="rId17"/>
-      <p:italic r:id="rId18"/>
-    </p:embeddedFont>
-    <p:embeddedFont>
-      <p:font typeface="Roboto" panose="02000000000000000000" pitchFamily="2" charset="0"/>
       <p:regular r:id="rId19"/>
       <p:bold r:id="rId20"/>
       <p:italic r:id="rId21"/>
       <p:boldItalic r:id="rId22"/>
     </p:embeddedFont>
+    <p:embeddedFont>
+      <p:font typeface="72 Brand Medium" panose="020B0604030603020204" pitchFamily="34" charset="0"/>
+      <p:regular r:id="rId23"/>
+      <p:italic r:id="rId24"/>
+    </p:embeddedFont>
+    <p:embeddedFont>
+      <p:font typeface="Roboto" panose="02000000000000000000" pitchFamily="2" charset="0"/>
+      <p:regular r:id="rId25"/>
+      <p:bold r:id="rId26"/>
+      <p:italic r:id="rId27"/>
+      <p:boldItalic r:id="rId28"/>
+    </p:embeddedFont>
   </p:embeddedFontLst>
   <p:custDataLst>
-    <p:tags r:id="rId23"/>
+    <p:tags r:id="rId29"/>
   </p:custDataLst>
   <p:defaultTextStyle>
     <a:defPPr>
@@ -20139,6 +20141,566 @@
           <a:chExt cx="0" cy="0"/>
         </a:xfrm>
       </p:grpSpPr>
+      <p:grpSp>
+        <p:nvGrpSpPr>
+          <p:cNvPr id="11" name="Group 10">
+            <a:extLst>
+              <a:ext uri="{FF2B5EF4-FFF2-40B4-BE49-F238E27FC236}">
+                <a16:creationId xmlns:a16="http://schemas.microsoft.com/office/drawing/2014/main" id="{4EDF3092-6348-DC7D-D855-0939C78C4C17}"/>
+              </a:ext>
+            </a:extLst>
+          </p:cNvPr>
+          <p:cNvGrpSpPr/>
+          <p:nvPr/>
+        </p:nvGrpSpPr>
+        <p:grpSpPr>
+          <a:xfrm>
+            <a:off x="6461575" y="1459868"/>
+            <a:ext cx="3600000" cy="3600000"/>
+            <a:chOff x="6461575" y="1459868"/>
+            <a:chExt cx="3600000" cy="3600000"/>
+          </a:xfrm>
+        </p:grpSpPr>
+        <p:sp>
+          <p:nvSpPr>
+            <p:cNvPr id="10" name="Rectangle: Rounded Corners 9">
+              <a:extLst>
+                <a:ext uri="{FF2B5EF4-FFF2-40B4-BE49-F238E27FC236}">
+                  <a16:creationId xmlns:a16="http://schemas.microsoft.com/office/drawing/2014/main" id="{5D4AB5FF-2D11-4DB3-D7CC-D64C3760BCEF}"/>
+                </a:ext>
+              </a:extLst>
+            </p:cNvPr>
+            <p:cNvSpPr/>
+            <p:nvPr/>
+          </p:nvSpPr>
+          <p:spPr bwMode="gray">
+            <a:xfrm>
+              <a:off x="6461575" y="1459868"/>
+              <a:ext cx="3600000" cy="3600000"/>
+            </a:xfrm>
+            <a:prstGeom prst="roundRect">
+              <a:avLst>
+                <a:gd name="adj" fmla="val 50000"/>
+              </a:avLst>
+            </a:prstGeom>
+            <a:gradFill>
+              <a:gsLst>
+                <a:gs pos="0">
+                  <a:schemeClr val="bg1">
+                    <a:lumMod val="50000"/>
+                  </a:schemeClr>
+                </a:gs>
+                <a:gs pos="48000">
+                  <a:schemeClr val="bg1">
+                    <a:lumMod val="75000"/>
+                  </a:schemeClr>
+                </a:gs>
+                <a:gs pos="100000">
+                  <a:schemeClr val="bg1"/>
+                </a:gs>
+              </a:gsLst>
+              <a:lin ang="13500000" scaled="0"/>
+            </a:gradFill>
+            <a:ln>
+              <a:noFill/>
+            </a:ln>
+          </p:spPr>
+          <p:style>
+            <a:lnRef idx="0">
+              <a:scrgbClr r="0" g="0" b="0"/>
+            </a:lnRef>
+            <a:fillRef idx="0">
+              <a:scrgbClr r="0" g="0" b="0"/>
+            </a:fillRef>
+            <a:effectRef idx="0">
+              <a:scrgbClr r="0" g="0" b="0"/>
+            </a:effectRef>
+            <a:fontRef idx="minor">
+              <a:schemeClr val="lt1"/>
+            </a:fontRef>
+          </p:style>
+          <p:txBody>
+            <a:bodyPr lIns="90000" tIns="72000" rIns="90000" bIns="72000" rtlCol="0" anchor="ctr"/>
+            <a:lstStyle/>
+            <a:p>
+              <a:pPr marR="0" algn="ctr" defTabSz="914400" eaLnBrk="1" fontAlgn="base" latinLnBrk="0" hangingPunct="1">
+                <a:lnSpc>
+                  <a:spcPct val="100000"/>
+                </a:lnSpc>
+                <a:spcBef>
+                  <a:spcPct val="50000"/>
+                </a:spcBef>
+                <a:spcAft>
+                  <a:spcPct val="0"/>
+                </a:spcAft>
+                <a:buClr>
+                  <a:srgbClr val="F0AB00"/>
+                </a:buClr>
+                <a:buSzPct val="80000"/>
+                <a:tabLst/>
+              </a:pPr>
+              <a:endParaRPr kumimoji="0" lang="de-DE" sz="1800" b="0" i="0" u="none" strike="noStrike" kern="0" cap="none" spc="0" normalizeH="0" baseline="0" noProof="0" dirty="0" err="1">
+                <a:ln>
+                  <a:noFill/>
+                </a:ln>
+                <a:effectLst/>
+                <a:uLnTx/>
+                <a:uFillTx/>
+                <a:ea typeface="Arial Unicode MS" pitchFamily="34" charset="-128"/>
+                <a:cs typeface="Arial Unicode MS" pitchFamily="34" charset="-128"/>
+              </a:endParaRPr>
+            </a:p>
+          </p:txBody>
+        </p:sp>
+        <p:sp>
+          <p:nvSpPr>
+            <p:cNvPr id="2" name="Rectangle: Rounded Corners 1">
+              <a:extLst>
+                <a:ext uri="{FF2B5EF4-FFF2-40B4-BE49-F238E27FC236}">
+                  <a16:creationId xmlns:a16="http://schemas.microsoft.com/office/drawing/2014/main" id="{D8A4611E-C6DA-E234-232C-A806D67601B9}"/>
+                </a:ext>
+              </a:extLst>
+            </p:cNvPr>
+            <p:cNvSpPr/>
+            <p:nvPr/>
+          </p:nvSpPr>
+          <p:spPr bwMode="gray">
+            <a:xfrm rot="-2700000">
+              <a:off x="6818242" y="3036047"/>
+              <a:ext cx="2886670" cy="447642"/>
+            </a:xfrm>
+            <a:prstGeom prst="roundRect">
+              <a:avLst>
+                <a:gd name="adj" fmla="val 50000"/>
+              </a:avLst>
+            </a:prstGeom>
+            <a:solidFill>
+              <a:srgbClr val="C00000"/>
+            </a:solidFill>
+            <a:ln w="127000" algn="ctr">
+              <a:solidFill>
+                <a:srgbClr val="00144A"/>
+              </a:solidFill>
+              <a:miter lim="800000"/>
+              <a:headEnd/>
+              <a:tailEnd/>
+            </a:ln>
+          </p:spPr>
+          <p:txBody>
+            <a:bodyPr lIns="90000" tIns="72000" rIns="90000" bIns="72000" rtlCol="0" anchor="ctr"/>
+            <a:lstStyle/>
+            <a:p>
+              <a:pPr marR="0" algn="ctr" defTabSz="914400" eaLnBrk="1" fontAlgn="base" latinLnBrk="0" hangingPunct="1">
+                <a:lnSpc>
+                  <a:spcPct val="100000"/>
+                </a:lnSpc>
+                <a:spcBef>
+                  <a:spcPct val="50000"/>
+                </a:spcBef>
+                <a:spcAft>
+                  <a:spcPct val="0"/>
+                </a:spcAft>
+                <a:buClr>
+                  <a:srgbClr val="F0AB00"/>
+                </a:buClr>
+                <a:buSzPct val="80000"/>
+                <a:tabLst/>
+              </a:pPr>
+              <a:endParaRPr kumimoji="0" lang="de-DE" sz="1800" b="0" i="0" u="none" strike="noStrike" kern="0" cap="none" spc="0" normalizeH="0" baseline="0" noProof="0" dirty="0" err="1">
+                <a:ln>
+                  <a:noFill/>
+                </a:ln>
+                <a:effectLst/>
+                <a:uLnTx/>
+                <a:uFillTx/>
+                <a:ea typeface="Arial Unicode MS" pitchFamily="34" charset="-128"/>
+                <a:cs typeface="Arial Unicode MS" pitchFamily="34" charset="-128"/>
+              </a:endParaRPr>
+            </a:p>
+          </p:txBody>
+        </p:sp>
+        <p:sp>
+          <p:nvSpPr>
+            <p:cNvPr id="17" name="Rectangle: Rounded Corners 16">
+              <a:extLst>
+                <a:ext uri="{FF2B5EF4-FFF2-40B4-BE49-F238E27FC236}">
+                  <a16:creationId xmlns:a16="http://schemas.microsoft.com/office/drawing/2014/main" id="{02A31D01-612A-D8D6-71D4-A48E38FC5F0D}"/>
+                </a:ext>
+              </a:extLst>
+            </p:cNvPr>
+            <p:cNvSpPr/>
+            <p:nvPr/>
+          </p:nvSpPr>
+          <p:spPr bwMode="gray">
+            <a:xfrm rot="2700000">
+              <a:off x="6818241" y="3036048"/>
+              <a:ext cx="2886670" cy="447642"/>
+            </a:xfrm>
+            <a:prstGeom prst="roundRect">
+              <a:avLst>
+                <a:gd name="adj" fmla="val 50000"/>
+              </a:avLst>
+            </a:prstGeom>
+            <a:solidFill>
+              <a:srgbClr val="FF0000"/>
+            </a:solidFill>
+            <a:ln w="127000" algn="ctr">
+              <a:solidFill>
+                <a:srgbClr val="00144A"/>
+              </a:solidFill>
+              <a:miter lim="800000"/>
+              <a:headEnd/>
+              <a:tailEnd/>
+            </a:ln>
+          </p:spPr>
+          <p:txBody>
+            <a:bodyPr lIns="90000" tIns="72000" rIns="90000" bIns="72000" rtlCol="0" anchor="ctr"/>
+            <a:lstStyle/>
+            <a:p>
+              <a:pPr marR="0" algn="ctr" defTabSz="914400" eaLnBrk="1" fontAlgn="base" latinLnBrk="0" hangingPunct="1">
+                <a:lnSpc>
+                  <a:spcPct val="100000"/>
+                </a:lnSpc>
+                <a:spcBef>
+                  <a:spcPct val="50000"/>
+                </a:spcBef>
+                <a:spcAft>
+                  <a:spcPct val="0"/>
+                </a:spcAft>
+                <a:buClr>
+                  <a:srgbClr val="F0AB00"/>
+                </a:buClr>
+                <a:buSzPct val="80000"/>
+                <a:tabLst/>
+              </a:pPr>
+              <a:endParaRPr kumimoji="0" lang="de-DE" sz="1800" b="0" i="0" u="none" strike="noStrike" kern="0" cap="none" spc="0" normalizeH="0" baseline="0" noProof="0" dirty="0" err="1">
+                <a:ln>
+                  <a:noFill/>
+                </a:ln>
+                <a:effectLst/>
+                <a:uLnTx/>
+                <a:uFillTx/>
+                <a:ea typeface="Arial Unicode MS" pitchFamily="34" charset="-128"/>
+                <a:cs typeface="Arial Unicode MS" pitchFamily="34" charset="-128"/>
+              </a:endParaRPr>
+            </a:p>
+          </p:txBody>
+        </p:sp>
+      </p:grpSp>
+    </p:spTree>
+    <p:custDataLst>
+      <p:custData r:id="rId1"/>
+      <p:custData r:id="rId2"/>
+    </p:custDataLst>
+    <p:extLst>
+      <p:ext uri="{BB962C8B-B14F-4D97-AF65-F5344CB8AC3E}">
+        <p14:creationId xmlns:p14="http://schemas.microsoft.com/office/powerpoint/2010/main" val="2052406257"/>
+      </p:ext>
+    </p:extLst>
+  </p:cSld>
+  <p:clrMapOvr>
+    <a:masterClrMapping/>
+  </p:clrMapOvr>
+</p:sld>
+</file>
+
+<file path=ppt/slides/slide3.xml><?xml version="1.0" encoding="utf-8"?>
+<p:sld xmlns:a="http://schemas.openxmlformats.org/drawingml/2006/main" xmlns:r="http://schemas.openxmlformats.org/officeDocument/2006/relationships" xmlns:p="http://schemas.openxmlformats.org/presentationml/2006/main">
+  <p:cSld>
+    <p:spTree>
+      <p:nvGrpSpPr>
+        <p:cNvPr id="1" name=""/>
+        <p:cNvGrpSpPr/>
+        <p:nvPr/>
+      </p:nvGrpSpPr>
+      <p:grpSpPr>
+        <a:xfrm>
+          <a:off x="0" y="0"/>
+          <a:ext cx="0" cy="0"/>
+          <a:chOff x="0" y="0"/>
+          <a:chExt cx="0" cy="0"/>
+        </a:xfrm>
+      </p:grpSpPr>
+      <p:grpSp>
+        <p:nvGrpSpPr>
+          <p:cNvPr id="5" name="Group 4">
+            <a:extLst>
+              <a:ext uri="{FF2B5EF4-FFF2-40B4-BE49-F238E27FC236}">
+                <a16:creationId xmlns:a16="http://schemas.microsoft.com/office/drawing/2014/main" id="{32CBEDD3-177E-A1AC-31EF-6A5535AD5718}"/>
+              </a:ext>
+            </a:extLst>
+          </p:cNvPr>
+          <p:cNvGrpSpPr/>
+          <p:nvPr/>
+        </p:nvGrpSpPr>
+        <p:grpSpPr>
+          <a:xfrm>
+            <a:off x="6461575" y="1459870"/>
+            <a:ext cx="3600000" cy="3600000"/>
+            <a:chOff x="6461575" y="1459870"/>
+            <a:chExt cx="3600000" cy="3600000"/>
+          </a:xfrm>
+        </p:grpSpPr>
+        <p:sp>
+          <p:nvSpPr>
+            <p:cNvPr id="7" name="Rectangle: Rounded Corners 6">
+              <a:extLst>
+                <a:ext uri="{FF2B5EF4-FFF2-40B4-BE49-F238E27FC236}">
+                  <a16:creationId xmlns:a16="http://schemas.microsoft.com/office/drawing/2014/main" id="{FD16A6AE-ECAA-77F6-B44C-B7AB32C14B0A}"/>
+                </a:ext>
+              </a:extLst>
+            </p:cNvPr>
+            <p:cNvSpPr/>
+            <p:nvPr/>
+          </p:nvSpPr>
+          <p:spPr bwMode="gray">
+            <a:xfrm>
+              <a:off x="6461575" y="1459870"/>
+              <a:ext cx="3600000" cy="3600000"/>
+            </a:xfrm>
+            <a:prstGeom prst="roundRect">
+              <a:avLst>
+                <a:gd name="adj" fmla="val 50000"/>
+              </a:avLst>
+            </a:prstGeom>
+            <a:gradFill>
+              <a:gsLst>
+                <a:gs pos="0">
+                  <a:schemeClr val="bg1">
+                    <a:lumMod val="50000"/>
+                  </a:schemeClr>
+                </a:gs>
+                <a:gs pos="48000">
+                  <a:schemeClr val="bg1">
+                    <a:lumMod val="75000"/>
+                  </a:schemeClr>
+                </a:gs>
+                <a:gs pos="100000">
+                  <a:schemeClr val="bg1"/>
+                </a:gs>
+              </a:gsLst>
+              <a:lin ang="13500000" scaled="0"/>
+            </a:gradFill>
+            <a:ln>
+              <a:noFill/>
+            </a:ln>
+          </p:spPr>
+          <p:style>
+            <a:lnRef idx="0">
+              <a:scrgbClr r="0" g="0" b="0"/>
+            </a:lnRef>
+            <a:fillRef idx="0">
+              <a:scrgbClr r="0" g="0" b="0"/>
+            </a:fillRef>
+            <a:effectRef idx="0">
+              <a:scrgbClr r="0" g="0" b="0"/>
+            </a:effectRef>
+            <a:fontRef idx="minor">
+              <a:schemeClr val="lt1"/>
+            </a:fontRef>
+          </p:style>
+          <p:txBody>
+            <a:bodyPr lIns="90000" tIns="72000" rIns="90000" bIns="72000" rtlCol="0" anchor="ctr"/>
+            <a:lstStyle/>
+            <a:p>
+              <a:pPr marR="0" algn="ctr" defTabSz="914400" eaLnBrk="1" fontAlgn="base" latinLnBrk="0" hangingPunct="1">
+                <a:lnSpc>
+                  <a:spcPct val="100000"/>
+                </a:lnSpc>
+                <a:spcBef>
+                  <a:spcPct val="50000"/>
+                </a:spcBef>
+                <a:spcAft>
+                  <a:spcPct val="0"/>
+                </a:spcAft>
+                <a:buClr>
+                  <a:srgbClr val="F0AB00"/>
+                </a:buClr>
+                <a:buSzPct val="80000"/>
+                <a:tabLst/>
+              </a:pPr>
+              <a:endParaRPr kumimoji="0" lang="de-DE" sz="1800" b="0" i="0" u="none" strike="noStrike" kern="0" cap="none" spc="0" normalizeH="0" baseline="0" noProof="0" dirty="0" err="1">
+                <a:ln>
+                  <a:noFill/>
+                </a:ln>
+                <a:effectLst/>
+                <a:uLnTx/>
+                <a:uFillTx/>
+                <a:ea typeface="Arial Unicode MS" pitchFamily="34" charset="-128"/>
+                <a:cs typeface="Arial Unicode MS" pitchFamily="34" charset="-128"/>
+              </a:endParaRPr>
+            </a:p>
+          </p:txBody>
+        </p:sp>
+        <p:sp>
+          <p:nvSpPr>
+            <p:cNvPr id="4" name="Rectangle: Rounded Corners 3">
+              <a:extLst>
+                <a:ext uri="{FF2B5EF4-FFF2-40B4-BE49-F238E27FC236}">
+                  <a16:creationId xmlns:a16="http://schemas.microsoft.com/office/drawing/2014/main" id="{ACC242C0-88A1-7AC2-57DE-A404BCD50B90}"/>
+                </a:ext>
+              </a:extLst>
+            </p:cNvPr>
+            <p:cNvSpPr/>
+            <p:nvPr/>
+          </p:nvSpPr>
+          <p:spPr bwMode="gray">
+            <a:xfrm>
+              <a:off x="8043284" y="4255563"/>
+              <a:ext cx="446400" cy="447642"/>
+            </a:xfrm>
+            <a:prstGeom prst="roundRect">
+              <a:avLst>
+                <a:gd name="adj" fmla="val 50000"/>
+              </a:avLst>
+            </a:prstGeom>
+            <a:solidFill>
+              <a:srgbClr val="FFFF00"/>
+            </a:solidFill>
+            <a:ln w="127000" algn="ctr">
+              <a:solidFill>
+                <a:srgbClr val="00144A"/>
+              </a:solidFill>
+              <a:miter lim="800000"/>
+              <a:headEnd/>
+              <a:tailEnd/>
+            </a:ln>
+          </p:spPr>
+          <p:txBody>
+            <a:bodyPr lIns="90000" tIns="72000" rIns="90000" bIns="72000" rtlCol="0" anchor="ctr"/>
+            <a:lstStyle/>
+            <a:p>
+              <a:pPr marR="0" algn="ctr" defTabSz="914400" eaLnBrk="1" fontAlgn="base" latinLnBrk="0" hangingPunct="1">
+                <a:lnSpc>
+                  <a:spcPct val="100000"/>
+                </a:lnSpc>
+                <a:spcBef>
+                  <a:spcPct val="50000"/>
+                </a:spcBef>
+                <a:spcAft>
+                  <a:spcPct val="0"/>
+                </a:spcAft>
+                <a:buClr>
+                  <a:srgbClr val="F0AB00"/>
+                </a:buClr>
+                <a:buSzPct val="80000"/>
+                <a:tabLst/>
+              </a:pPr>
+              <a:endParaRPr kumimoji="0" lang="de-DE" sz="1800" b="0" i="0" u="none" strike="noStrike" kern="0" cap="none" spc="0" normalizeH="0" baseline="0" noProof="0" dirty="0" err="1">
+                <a:ln>
+                  <a:noFill/>
+                </a:ln>
+                <a:effectLst/>
+                <a:uLnTx/>
+                <a:uFillTx/>
+                <a:ea typeface="Arial Unicode MS" pitchFamily="34" charset="-128"/>
+                <a:cs typeface="Arial Unicode MS" pitchFamily="34" charset="-128"/>
+              </a:endParaRPr>
+            </a:p>
+          </p:txBody>
+        </p:sp>
+        <p:sp>
+          <p:nvSpPr>
+            <p:cNvPr id="17" name="Rectangle: Rounded Corners 16">
+              <a:extLst>
+                <a:ext uri="{FF2B5EF4-FFF2-40B4-BE49-F238E27FC236}">
+                  <a16:creationId xmlns:a16="http://schemas.microsoft.com/office/drawing/2014/main" id="{02A31D01-612A-D8D6-71D4-A48E38FC5F0D}"/>
+                </a:ext>
+              </a:extLst>
+            </p:cNvPr>
+            <p:cNvSpPr/>
+            <p:nvPr/>
+          </p:nvSpPr>
+          <p:spPr bwMode="gray">
+            <a:xfrm rot="5400000">
+              <a:off x="7186449" y="2667840"/>
+              <a:ext cx="2150251" cy="447642"/>
+            </a:xfrm>
+            <a:prstGeom prst="roundRect">
+              <a:avLst>
+                <a:gd name="adj" fmla="val 50000"/>
+              </a:avLst>
+            </a:prstGeom>
+            <a:solidFill>
+              <a:srgbClr val="FFC000"/>
+            </a:solidFill>
+            <a:ln w="127000" algn="ctr">
+              <a:solidFill>
+                <a:srgbClr val="00144A"/>
+              </a:solidFill>
+              <a:miter lim="800000"/>
+              <a:headEnd/>
+              <a:tailEnd/>
+            </a:ln>
+          </p:spPr>
+          <p:txBody>
+            <a:bodyPr lIns="90000" tIns="72000" rIns="90000" bIns="72000" rtlCol="0" anchor="ctr"/>
+            <a:lstStyle/>
+            <a:p>
+              <a:pPr marR="0" algn="ctr" defTabSz="914400" eaLnBrk="1" fontAlgn="base" latinLnBrk="0" hangingPunct="1">
+                <a:lnSpc>
+                  <a:spcPct val="100000"/>
+                </a:lnSpc>
+                <a:spcBef>
+                  <a:spcPct val="50000"/>
+                </a:spcBef>
+                <a:spcAft>
+                  <a:spcPct val="0"/>
+                </a:spcAft>
+                <a:buClr>
+                  <a:srgbClr val="F0AB00"/>
+                </a:buClr>
+                <a:buSzPct val="80000"/>
+                <a:tabLst/>
+              </a:pPr>
+              <a:endParaRPr kumimoji="0" lang="de-DE" sz="1800" b="0" i="0" u="none" strike="noStrike" kern="0" cap="none" spc="0" normalizeH="0" baseline="0" noProof="0" dirty="0" err="1">
+                <a:ln>
+                  <a:noFill/>
+                </a:ln>
+                <a:effectLst/>
+                <a:uLnTx/>
+                <a:uFillTx/>
+                <a:ea typeface="Arial Unicode MS" pitchFamily="34" charset="-128"/>
+                <a:cs typeface="Arial Unicode MS" pitchFamily="34" charset="-128"/>
+              </a:endParaRPr>
+            </a:p>
+          </p:txBody>
+        </p:sp>
+      </p:grpSp>
+    </p:spTree>
+    <p:custDataLst>
+      <p:custData r:id="rId1"/>
+      <p:custData r:id="rId2"/>
+    </p:custDataLst>
+    <p:extLst>
+      <p:ext uri="{BB962C8B-B14F-4D97-AF65-F5344CB8AC3E}">
+        <p14:creationId xmlns:p14="http://schemas.microsoft.com/office/powerpoint/2010/main" val="1522925084"/>
+      </p:ext>
+    </p:extLst>
+  </p:cSld>
+  <p:clrMapOvr>
+    <a:masterClrMapping/>
+  </p:clrMapOvr>
+</p:sld>
+</file>
+
+<file path=ppt/slides/slide4.xml><?xml version="1.0" encoding="utf-8"?>
+<p:sld xmlns:a="http://schemas.openxmlformats.org/drawingml/2006/main" xmlns:r="http://schemas.openxmlformats.org/officeDocument/2006/relationships" xmlns:p="http://schemas.openxmlformats.org/presentationml/2006/main">
+  <p:cSld>
+    <p:spTree>
+      <p:nvGrpSpPr>
+        <p:cNvPr id="1" name=""/>
+        <p:cNvGrpSpPr/>
+        <p:nvPr/>
+      </p:nvGrpSpPr>
+      <p:grpSpPr>
+        <a:xfrm>
+          <a:off x="0" y="0"/>
+          <a:ext cx="0" cy="0"/>
+          <a:chOff x="0" y="0"/>
+          <a:chExt cx="0" cy="0"/>
+        </a:xfrm>
+      </p:grpSpPr>
       <p:sp>
         <p:nvSpPr>
           <p:cNvPr id="8" name="Rectangle: Rounded Corners 7">
@@ -21889,6 +22451,53 @@
 </file>
 
 <file path=customXml/item1.xml><?xml version="1.0" encoding="utf-8"?>
+<p:properties xmlns:p="http://schemas.microsoft.com/office/2006/metadata/properties" xmlns:xsi="http://www.w3.org/2001/XMLSchema-instance" xmlns:pc="http://schemas.microsoft.com/office/infopath/2007/PartnerControls">
+  <documentManagement>
+    <ResponsibleContact xmlns="47fc58d8-9f4b-4bc8-b278-c3cb6f298023">
+      <UserInfo>
+        <DisplayName/>
+        <AccountId xsi:nil="true"/>
+        <AccountType/>
+      </UserInfo>
+    </ResponsibleContact>
+  </documentManagement>
+</p:properties>
+</file>
+
+<file path=customXml/item10.xml><?xml version="1.0" encoding="utf-8"?>
+<TemplafySlideTemplateConfiguration><![CDATA[{"slideVersion":1,"isValidatorEnabled":false,"isLocked":false,"elementsMetadata":[],"slideId":"638332923623002646","enableDocumentContentUpdater":false,"version":"2.0"}]]></TemplafySlideTemplateConfiguration>
+</file>
+
+<file path=customXml/item11.xml><?xml version="1.0" encoding="utf-8"?>
+<TemplafySlideFormConfiguration><![CDATA[{"formFields":[],"formDataEntries":[]}]]></TemplafySlideFormConfiguration>
+</file>
+
+<file path=customXml/item2.xml><?xml version="1.0" encoding="utf-8"?>
+<TemplafySlideFormConfiguration><![CDATA[{"formFields":[],"formDataEntries":[]}]]></TemplafySlideFormConfiguration>
+</file>
+
+<file path=customXml/item3.xml><?xml version="1.0" encoding="utf-8"?>
+<TemplafySlideTemplateConfiguration><![CDATA[{"slideVersion":1,"isValidatorEnabled":false,"isLocked":false,"elementsMetadata":[],"slideId":"638332923623002646","enableDocumentContentUpdater":false,"version":"2.0"}]]></TemplafySlideTemplateConfiguration>
+</file>
+
+<file path=customXml/item4.xml><?xml version="1.0" encoding="utf-8"?>
+<TemplafyFormConfiguration><![CDATA[{"formFields":[{"distinct":false,"hideIfNoUserInteractionRequired":false,"required":false,"defaultValue":" SAP Corporate","autoSelectFirstOption":false,"shareValue":false,"type":"dropDown","dataSourceName":"PPTSubBrandLogos2023","dataSourceFieldName":"Name","name":"SAPLogo","label":"Select Template"},{"distinct":false,"hideIfNoUserInteractionRequired":false,"required":false,"defaultValue":"INTERNAL - SAP Only","autoSelectFirstOption":false,"shareValue":false,"type":"dropDown","dataSourceName":"Classification","dataSourceFieldName":"Name","name":"Classification","label":"Select Classification"}],"formDataEntries":[]}]]></TemplafyFormConfiguration>
+</file>
+
+<file path=customXml/item5.xml><?xml version="1.0" encoding="utf-8"?>
+<TemplafyTemplateConfiguration><![CDATA[{"elementsMetadata":[{"type":"shape","id":"cc8e468e-a684-4436-bb3e-1297295cb50d","elementConfiguration":{"binding":"{{ DataSources.Classification[Form.Classification.Name].Display}}","type":"text","disableUpdates":false}},{"type":"shape","id":"de91e729-5bb1-4795-9fea-362174f4747e","elementConfiguration":{"inheritDimensions":"{{InheritDimensions.InheritNone}}","width":"","height":"1 cm","image":"{{Form.SAPLogo.SubbrandBlue}}","visibility":"","type":"image","disableUpdates":false}},{"type":"shape","id":"a7bfa048-fe09-4bc0-9368-3d4a05fc6694","elementConfiguration":{"binding":"{{Form.Classification.Display}}","visibility":"","type":"text","disableUpdates":false}},{"type":"shape","id":"115e00a6-ce74-42db-968b-978229784cdb","elementConfiguration":{"binding":"{{Form.Classification.Display}}","visibility":"","type":"text","disableUpdates":false}},{"type":"shape","id":"29484993-5489-474a-8d89-6f9d7f37ddde","elementConfiguration":{"inheritDimensions":"{{InheritDimensions.InheritNone}}","width":"","height":"1 cm","image":"{{Form.SAPLogo.SubbrandBlack}}","visibility":"","type":"image","disableUpdates":false}},{"type":"shape","id":"33a95fff-b2fb-4d19-bcbf-974d4dc636ad","elementConfiguration":{"inheritDimensions":"{{InheritDimensions.InheritNone}}","width":"","height":"1 cm","image":"{{Form.SAPLogo.SubbrandWhite}}","visibility":"","type":"image","disableUpdates":false}},{"type":"shape","id":"1e847fea-e6bf-426f-bd13-589b4eb52b32","elementConfiguration":{"binding":"{{Form.Classification.Display}}","visibility":"","type":"text","disableUpdates":false}},{"type":"shape","id":"a0ac9992-fd82-4d9f-9f8f-3c4e61abfea7","elementConfiguration":{"inheritDimensions":"{{InheritDimensions.InheritNone}}","width":"","height":"1 cm","image":"{{Form.SAPLogo.SubbrandBlue}}","visibility":"","type":"image","disableUpdates":false}},{"type":"shape","id":"875588db-ab0c-48df-b14c-bba850e89fd4","elementConfiguration":{"binding":"{{Form.Classification.Display}}","visibility":"","type":"text","disableUpdates":false}},{"type":"shape","id":"ca80d2d7-4d92-4ba5-afad-4c3f10f43ed2","elementConfiguration":{"inheritDimensions":"{{InheritDimensions.InheritNone}}","width":"","height":"1 cm","image":"{{Form.SAPLogo.SubbrandBlue}}","visibility":"","type":"image","disableUpdates":false}},{"type":"shape","id":"913d0042-08d6-4f76-9998-0e07de5e0e91","elementConfiguration":{"binding":"{{Form.Classification.Display}}","visibility":"","type":"text","disableUpdates":false}},{"type":"shape","id":"529053bf-483d-4029-80cb-c2f664cb9b85","elementConfiguration":{"inheritDimensions":"{{InheritDimensions.InheritNone}}","width":"","height":"1 cm","image":"{{Form.SAPLogo.SubbrandBlack}}","visibility":"","type":"image","disableUpdates":false}},{"type":"shape","id":"8bc02bef-9b28-4859-a5a0-1b7f9f164ef6","elementConfiguration":{"binding":"{{Form.Classification.Display}}","visibility":"","type":"text","disableUpdates":false}},{"type":"shape","id":"93ca9c6a-8a49-4268-811a-224367b582f8","elementConfiguration":{"inheritDimensions":"{{InheritDimensions.InheritNone}}","width":"","height":"1 cm","image":"{{Form.SAPLogo.SubbrandWhite}}","visibility":"","type":"image","disableUpdates":false}},{"type":"shape","id":"60cd6c4d-0e48-44d1-98b0-ffa88a49d4b4","elementConfiguration":{"binding":"{{Form.Classification.Display}}","visibility":"","type":"text","disableUpdates":false}},{"type":"shape","id":"01a973d9-245c-46ba-8ba4-102fe29ea57c","elementConfiguration":{"inheritDimensions":"{{InheritDimensions.InheritNone}}","width":"","height":"1 cm","image":"{{Form.SAPLogo.SubbrandWhite}}","visibility":"","type":"image","disableUpdates":false}},{"type":"shape","id":"e2f30211-6978-4a1c-ae71-caa5a60aaeb9","elementConfiguration":{"binding":"{{Form.Classification.Display}}","visibility":"","type":"text","disableUpdates":false}},{"type":"shape","id":"f6c71bc2-28d7-43eb-b32c-7d33ea1ef0f4","elementConfiguration":{"inheritDimensions":"{{InheritDimensions.InheritNone}}","width":"","height":"1 cm","image":"{{Form.SAPLogo.SubbrandBlue}}","visibility":"","type":"image","disableUpdates":false}},{"type":"shape","id":"2dc8061e-0f1c-4b16-a9d5-7042717da8d3","elementConfiguration":{"binding":"{{Form.Classification.Display}}","visibility":"","type":"text","disableUpdates":false}},{"type":"shape","id":"a2d983ff-7e26-44a8-ae56-49716b6efc9d","elementConfiguration":{"inheritDimensions":"{{InheritDimensions.InheritNone}}","width":"","height":"1 cm","image":"{{Form.SAPLogo.SubbrandWhite}}","visibility":"","type":"image","disableUpdates":false}},{"type":"shape","id":"a5adb6d0-6bfb-4c6b-ba9f-cc85b698ab79","elementConfiguration":{"binding":"{{Form.Classification.Display}}","visibility":"","type":"text","disableUpdates":false}},{"type":"shape","id":"c7b4e9f9-3f6f-4e3b-9d75-9af04fe7bfb8","elementConfiguration":{"binding":"{{DataSources.PPTCopyRight[\"Slide 5 copyright\"].CopyrightMessage}}","visibility":"","type":"text","disableUpdates":false}},{"type":"shape","id":"cac4713c-bd58-4793-baf6-c43fc9874ce4","elementConfiguration":{"inheritDimensions":"{{InheritDimensions.InheritNone}}","width":"","height":"1 cm","image":"{{Form.SAPLogo.SubbrandBlack}}","visibility":"","type":"image","disableUpdates":false}},{"type":"shape","id":"f74c119a-3bfe-44fd-9158-8a12b2d79096","elementConfiguration":{"binding":"{{Form.Classification.Display}}","visibility":"","type":"text","disableUpdates":false}},{"type":"shape","id":"6b80313d-2fb5-4787-a28f-c35e41640fad","elementConfiguration":{"inheritDimensions":"{{InheritDimensions.InheritNone}}","width":"","height":"1 cm","image":"{{Form.SAPLogo.SubbrandWhite}}","visibility":"","type":"image","disableUpdates":false}},{"type":"shape","id":"ecff37a8-d50d-48a9-baf4-f0d3e6dbf3b4","elementConfiguration":{"binding":"{{Form.Classification.Display}}","visibility":"","type":"text","disableUpdates":false}}],"transformationConfigurations":[],"templateName":"Blank - PowerPoint_20231019","templateDescription":"","enableDocumentContentUpdater":true,"version":"2.0"}]]></TemplafyTemplateConfiguration>
+</file>
+
+<file path=customXml/item6.xml><?xml version="1.0" encoding="utf-8"?>
+<?mso-contentType ?>
+<FormTemplates xmlns="http://schemas.microsoft.com/sharepoint/v3/contenttype/forms">
+  <Display>DocumentLibraryForm</Display>
+  <Edit>DocumentLibraryForm</Edit>
+  <New>DocumentLibraryForm</New>
+</FormTemplates>
+</file>
+
+<file path=customXml/item7.xml><?xml version="1.0" encoding="utf-8"?>
 <ct:contentTypeSchema xmlns:ct="http://schemas.microsoft.com/office/2006/metadata/contentType" xmlns:ma="http://schemas.microsoft.com/office/2006/metadata/properties/metaAttributes" ct:_="" ma:_="" ma:contentTypeName="Document" ma:contentTypeID="0x010100615F0F9DCBF1E94796646FCF98A7C072" ma:contentTypeVersion="13" ma:contentTypeDescription="Create a new document." ma:contentTypeScope="" ma:versionID="5b306df2387467d165757eb5a8cdddaa">
   <xsd:schema xmlns:xsd="http://www.w3.org/2001/XMLSchema" xmlns:xs="http://www.w3.org/2001/XMLSchema" xmlns:p="http://schemas.microsoft.com/office/2006/metadata/properties" xmlns:ns2="0e00d59e-b0d2-4e67-be34-67e465b0fbed" xmlns:ns3="47fc58d8-9f4b-4bc8-b278-c3cb6f298023" targetNamespace="http://schemas.microsoft.com/office/2006/metadata/properties" ma:root="true" ma:fieldsID="eebd9c38828bcd412c0ba6e1c1867684" ns2:_="" ns3:_="">
     <xsd:import namespace="0e00d59e-b0d2-4e67-be34-67e465b0fbed"/>
@@ -22125,46 +22734,76 @@
 </ct:contentTypeSchema>
 </file>
 
-<file path=customXml/item2.xml><?xml version="1.0" encoding="utf-8"?>
-<?mso-contentType ?>
-<FormTemplates xmlns="http://schemas.microsoft.com/sharepoint/v3/contenttype/forms">
-  <Display>DocumentLibraryForm</Display>
-  <Edit>DocumentLibraryForm</Edit>
-  <New>DocumentLibraryForm</New>
-</FormTemplates>
-</file>
-
-<file path=customXml/item3.xml><?xml version="1.0" encoding="utf-8"?>
-<TemplafyFormConfiguration><![CDATA[{"formFields":[{"distinct":false,"hideIfNoUserInteractionRequired":false,"required":false,"defaultValue":" SAP Corporate","autoSelectFirstOption":false,"shareValue":false,"type":"dropDown","dataSourceName":"PPTSubBrandLogos2023","dataSourceFieldName":"Name","name":"SAPLogo","label":"Select Template"},{"distinct":false,"hideIfNoUserInteractionRequired":false,"required":false,"defaultValue":"INTERNAL - SAP Only","autoSelectFirstOption":false,"shareValue":false,"type":"dropDown","dataSourceName":"Classification","dataSourceFieldName":"Name","name":"Classification","label":"Select Classification"}],"formDataEntries":[]}]]></TemplafyFormConfiguration>
-</file>
-
-<file path=customXml/item4.xml><?xml version="1.0" encoding="utf-8"?>
+<file path=customXml/item8.xml><?xml version="1.0" encoding="utf-8"?>
 <TemplafySlideTemplateConfiguration><![CDATA[{"slideVersion":1,"isValidatorEnabled":false,"isLocked":false,"elementsMetadata":[],"slideId":"638332923623002646","enableDocumentContentUpdater":false,"version":"2.0"}]]></TemplafySlideTemplateConfiguration>
 </file>
 
-<file path=customXml/item5.xml><?xml version="1.0" encoding="utf-8"?>
+<file path=customXml/item9.xml><?xml version="1.0" encoding="utf-8"?>
 <TemplafySlideFormConfiguration><![CDATA[{"formFields":[],"formDataEntries":[]}]]></TemplafySlideFormConfiguration>
 </file>
 
-<file path=customXml/item6.xml><?xml version="1.0" encoding="utf-8"?>
-<p:properties xmlns:p="http://schemas.microsoft.com/office/2006/metadata/properties" xmlns:xsi="http://www.w3.org/2001/XMLSchema-instance" xmlns:pc="http://schemas.microsoft.com/office/infopath/2007/PartnerControls">
-  <documentManagement>
-    <ResponsibleContact xmlns="47fc58d8-9f4b-4bc8-b278-c3cb6f298023">
-      <UserInfo>
-        <DisplayName/>
-        <AccountId xsi:nil="true"/>
-        <AccountType/>
-      </UserInfo>
-    </ResponsibleContact>
-  </documentManagement>
-</p:properties>
+<file path=customXml/itemProps1.xml><?xml version="1.0" encoding="utf-8"?>
+<ds:datastoreItem xmlns:ds="http://schemas.openxmlformats.org/officeDocument/2006/customXml" ds:itemID="{C1422F45-04DB-421D-8796-270006657806}">
+  <ds:schemaRefs>
+    <ds:schemaRef ds:uri="http://schemas.microsoft.com/office/2006/metadata/properties"/>
+    <ds:schemaRef ds:uri="http://purl.org/dc/terms/"/>
+    <ds:schemaRef ds:uri="http://schemas.openxmlformats.org/package/2006/metadata/core-properties"/>
+    <ds:schemaRef ds:uri="0e00d59e-b0d2-4e67-be34-67e465b0fbed"/>
+    <ds:schemaRef ds:uri="http://schemas.microsoft.com/office/2006/documentManagement/types"/>
+    <ds:schemaRef ds:uri="http://schemas.microsoft.com/office/infopath/2007/PartnerControls"/>
+    <ds:schemaRef ds:uri="http://purl.org/dc/elements/1.1/"/>
+    <ds:schemaRef ds:uri="47fc58d8-9f4b-4bc8-b278-c3cb6f298023"/>
+    <ds:schemaRef ds:uri="http://www.w3.org/XML/1998/namespace"/>
+    <ds:schemaRef ds:uri="http://purl.org/dc/dcmitype/"/>
+  </ds:schemaRefs>
+</ds:datastoreItem>
 </file>
 
-<file path=customXml/item7.xml><?xml version="1.0" encoding="utf-8"?>
-<TemplafyTemplateConfiguration><![CDATA[{"elementsMetadata":[{"type":"shape","id":"cc8e468e-a684-4436-bb3e-1297295cb50d","elementConfiguration":{"binding":"{{ DataSources.Classification[Form.Classification.Name].Display}}","type":"text","disableUpdates":false}},{"type":"shape","id":"de91e729-5bb1-4795-9fea-362174f4747e","elementConfiguration":{"inheritDimensions":"{{InheritDimensions.InheritNone}}","width":"","height":"1 cm","image":"{{Form.SAPLogo.SubbrandBlue}}","visibility":"","type":"image","disableUpdates":false}},{"type":"shape","id":"a7bfa048-fe09-4bc0-9368-3d4a05fc6694","elementConfiguration":{"binding":"{{Form.Classification.Display}}","visibility":"","type":"text","disableUpdates":false}},{"type":"shape","id":"115e00a6-ce74-42db-968b-978229784cdb","elementConfiguration":{"binding":"{{Form.Classification.Display}}","visibility":"","type":"text","disableUpdates":false}},{"type":"shape","id":"29484993-5489-474a-8d89-6f9d7f37ddde","elementConfiguration":{"inheritDimensions":"{{InheritDimensions.InheritNone}}","width":"","height":"1 cm","image":"{{Form.SAPLogo.SubbrandBlack}}","visibility":"","type":"image","disableUpdates":false}},{"type":"shape","id":"33a95fff-b2fb-4d19-bcbf-974d4dc636ad","elementConfiguration":{"inheritDimensions":"{{InheritDimensions.InheritNone}}","width":"","height":"1 cm","image":"{{Form.SAPLogo.SubbrandWhite}}","visibility":"","type":"image","disableUpdates":false}},{"type":"shape","id":"1e847fea-e6bf-426f-bd13-589b4eb52b32","elementConfiguration":{"binding":"{{Form.Classification.Display}}","visibility":"","type":"text","disableUpdates":false}},{"type":"shape","id":"a0ac9992-fd82-4d9f-9f8f-3c4e61abfea7","elementConfiguration":{"inheritDimensions":"{{InheritDimensions.InheritNone}}","width":"","height":"1 cm","image":"{{Form.SAPLogo.SubbrandBlue}}","visibility":"","type":"image","disableUpdates":false}},{"type":"shape","id":"875588db-ab0c-48df-b14c-bba850e89fd4","elementConfiguration":{"binding":"{{Form.Classification.Display}}","visibility":"","type":"text","disableUpdates":false}},{"type":"shape","id":"ca80d2d7-4d92-4ba5-afad-4c3f10f43ed2","elementConfiguration":{"inheritDimensions":"{{InheritDimensions.InheritNone}}","width":"","height":"1 cm","image":"{{Form.SAPLogo.SubbrandBlue}}","visibility":"","type":"image","disableUpdates":false}},{"type":"shape","id":"913d0042-08d6-4f76-9998-0e07de5e0e91","elementConfiguration":{"binding":"{{Form.Classification.Display}}","visibility":"","type":"text","disableUpdates":false}},{"type":"shape","id":"529053bf-483d-4029-80cb-c2f664cb9b85","elementConfiguration":{"inheritDimensions":"{{InheritDimensions.InheritNone}}","width":"","height":"1 cm","image":"{{Form.SAPLogo.SubbrandBlack}}","visibility":"","type":"image","disableUpdates":false}},{"type":"shape","id":"8bc02bef-9b28-4859-a5a0-1b7f9f164ef6","elementConfiguration":{"binding":"{{Form.Classification.Display}}","visibility":"","type":"text","disableUpdates":false}},{"type":"shape","id":"93ca9c6a-8a49-4268-811a-224367b582f8","elementConfiguration":{"inheritDimensions":"{{InheritDimensions.InheritNone}}","width":"","height":"1 cm","image":"{{Form.SAPLogo.SubbrandWhite}}","visibility":"","type":"image","disableUpdates":false}},{"type":"shape","id":"60cd6c4d-0e48-44d1-98b0-ffa88a49d4b4","elementConfiguration":{"binding":"{{Form.Classification.Display}}","visibility":"","type":"text","disableUpdates":false}},{"type":"shape","id":"01a973d9-245c-46ba-8ba4-102fe29ea57c","elementConfiguration":{"inheritDimensions":"{{InheritDimensions.InheritNone}}","width":"","height":"1 cm","image":"{{Form.SAPLogo.SubbrandWhite}}","visibility":"","type":"image","disableUpdates":false}},{"type":"shape","id":"e2f30211-6978-4a1c-ae71-caa5a60aaeb9","elementConfiguration":{"binding":"{{Form.Classification.Display}}","visibility":"","type":"text","disableUpdates":false}},{"type":"shape","id":"f6c71bc2-28d7-43eb-b32c-7d33ea1ef0f4","elementConfiguration":{"inheritDimensions":"{{InheritDimensions.InheritNone}}","width":"","height":"1 cm","image":"{{Form.SAPLogo.SubbrandBlue}}","visibility":"","type":"image","disableUpdates":false}},{"type":"shape","id":"2dc8061e-0f1c-4b16-a9d5-7042717da8d3","elementConfiguration":{"binding":"{{Form.Classification.Display}}","visibility":"","type":"text","disableUpdates":false}},{"type":"shape","id":"a2d983ff-7e26-44a8-ae56-49716b6efc9d","elementConfiguration":{"inheritDimensions":"{{InheritDimensions.InheritNone}}","width":"","height":"1 cm","image":"{{Form.SAPLogo.SubbrandWhite}}","visibility":"","type":"image","disableUpdates":false}},{"type":"shape","id":"a5adb6d0-6bfb-4c6b-ba9f-cc85b698ab79","elementConfiguration":{"binding":"{{Form.Classification.Display}}","visibility":"","type":"text","disableUpdates":false}},{"type":"shape","id":"c7b4e9f9-3f6f-4e3b-9d75-9af04fe7bfb8","elementConfiguration":{"binding":"{{DataSources.PPTCopyRight[\"Slide 5 copyright\"].CopyrightMessage}}","visibility":"","type":"text","disableUpdates":false}},{"type":"shape","id":"cac4713c-bd58-4793-baf6-c43fc9874ce4","elementConfiguration":{"inheritDimensions":"{{InheritDimensions.InheritNone}}","width":"","height":"1 cm","image":"{{Form.SAPLogo.SubbrandBlack}}","visibility":"","type":"image","disableUpdates":false}},{"type":"shape","id":"f74c119a-3bfe-44fd-9158-8a12b2d79096","elementConfiguration":{"binding":"{{Form.Classification.Display}}","visibility":"","type":"text","disableUpdates":false}},{"type":"shape","id":"6b80313d-2fb5-4787-a28f-c35e41640fad","elementConfiguration":{"inheritDimensions":"{{InheritDimensions.InheritNone}}","width":"","height":"1 cm","image":"{{Form.SAPLogo.SubbrandWhite}}","visibility":"","type":"image","disableUpdates":false}},{"type":"shape","id":"ecff37a8-d50d-48a9-baf4-f0d3e6dbf3b4","elementConfiguration":{"binding":"{{Form.Classification.Display}}","visibility":"","type":"text","disableUpdates":false}}],"transformationConfigurations":[],"templateName":"Blank - PowerPoint_20231019","templateDescription":"","enableDocumentContentUpdater":true,"version":"2.0"}]]></TemplafyTemplateConfiguration>
+<file path=customXml/itemProps10.xml><?xml version="1.0" encoding="utf-8"?>
+<ds:datastoreItem xmlns:ds="http://schemas.openxmlformats.org/officeDocument/2006/customXml" ds:itemID="{5092A07C-9F00-4002-B0E4-D0BF2884EA19}">
+  <ds:schemaRefs/>
+</ds:datastoreItem>
 </file>
 
-<file path=customXml/itemProps1.xml><?xml version="1.0" encoding="utf-8"?>
+<file path=customXml/itemProps11.xml><?xml version="1.0" encoding="utf-8"?>
+<ds:datastoreItem xmlns:ds="http://schemas.openxmlformats.org/officeDocument/2006/customXml" ds:itemID="{DD4070DA-7569-468F-8A9C-FDDE34806EB7}">
+  <ds:schemaRefs/>
+</ds:datastoreItem>
+</file>
+
+<file path=customXml/itemProps2.xml><?xml version="1.0" encoding="utf-8"?>
+<ds:datastoreItem xmlns:ds="http://schemas.openxmlformats.org/officeDocument/2006/customXml" ds:itemID="{91D4C477-4CBF-4833-A763-167B6759CA65}">
+  <ds:schemaRefs/>
+</ds:datastoreItem>
+</file>
+
+<file path=customXml/itemProps3.xml><?xml version="1.0" encoding="utf-8"?>
+<ds:datastoreItem xmlns:ds="http://schemas.openxmlformats.org/officeDocument/2006/customXml" ds:itemID="{2E566E46-38D1-4FF6-AC12-AFCFCA15E440}">
+  <ds:schemaRefs/>
+</ds:datastoreItem>
+</file>
+
+<file path=customXml/itemProps4.xml><?xml version="1.0" encoding="utf-8"?>
+<ds:datastoreItem xmlns:ds="http://schemas.openxmlformats.org/officeDocument/2006/customXml" ds:itemID="{CC49FFC8-2FF3-4057-96F0-3BCD1A4F0351}">
+  <ds:schemaRefs/>
+</ds:datastoreItem>
+</file>
+
+<file path=customXml/itemProps5.xml><?xml version="1.0" encoding="utf-8"?>
+<ds:datastoreItem xmlns:ds="http://schemas.openxmlformats.org/officeDocument/2006/customXml" ds:itemID="{626BBCBB-1894-4E66-BA48-9E91CE3ACBA0}">
+  <ds:schemaRefs/>
+</ds:datastoreItem>
+</file>
+
+<file path=customXml/itemProps6.xml><?xml version="1.0" encoding="utf-8"?>
+<ds:datastoreItem xmlns:ds="http://schemas.openxmlformats.org/officeDocument/2006/customXml" ds:itemID="{291DCB28-1C52-4C0E-804A-6BD2D3F0FB8D}">
+  <ds:schemaRefs>
+    <ds:schemaRef ds:uri="http://schemas.microsoft.com/sharepoint/v3/contenttype/forms"/>
+  </ds:schemaRefs>
+</ds:datastoreItem>
+</file>
+
+<file path=customXml/itemProps7.xml><?xml version="1.0" encoding="utf-8"?>
 <ds:datastoreItem xmlns:ds="http://schemas.openxmlformats.org/officeDocument/2006/customXml" ds:itemID="{B3812128-B7DF-461F-A8F2-831754A1D2F6}">
   <ds:schemaRefs>
     <ds:schemaRef ds:uri="http://schemas.microsoft.com/office/2006/metadata/contentType"/>
@@ -22183,51 +22822,14 @@
 </ds:datastoreItem>
 </file>
 
-<file path=customXml/itemProps2.xml><?xml version="1.0" encoding="utf-8"?>
-<ds:datastoreItem xmlns:ds="http://schemas.openxmlformats.org/officeDocument/2006/customXml" ds:itemID="{291DCB28-1C52-4C0E-804A-6BD2D3F0FB8D}">
-  <ds:schemaRefs>
-    <ds:schemaRef ds:uri="http://schemas.microsoft.com/sharepoint/v3/contenttype/forms"/>
-  </ds:schemaRefs>
-</ds:datastoreItem>
-</file>
-
-<file path=customXml/itemProps3.xml><?xml version="1.0" encoding="utf-8"?>
-<ds:datastoreItem xmlns:ds="http://schemas.openxmlformats.org/officeDocument/2006/customXml" ds:itemID="{CC49FFC8-2FF3-4057-96F0-3BCD1A4F0351}">
+<file path=customXml/itemProps8.xml><?xml version="1.0" encoding="utf-8"?>
+<ds:datastoreItem xmlns:ds="http://schemas.openxmlformats.org/officeDocument/2006/customXml" ds:itemID="{CBB1A2F8-0B05-46E3-A78F-C26F52EC307C}">
   <ds:schemaRefs/>
 </ds:datastoreItem>
 </file>
 
-<file path=customXml/itemProps4.xml><?xml version="1.0" encoding="utf-8"?>
-<ds:datastoreItem xmlns:ds="http://schemas.openxmlformats.org/officeDocument/2006/customXml" ds:itemID="{2E566E46-38D1-4FF6-AC12-AFCFCA15E440}">
-  <ds:schemaRefs/>
-</ds:datastoreItem>
-</file>
-
-<file path=customXml/itemProps5.xml><?xml version="1.0" encoding="utf-8"?>
-<ds:datastoreItem xmlns:ds="http://schemas.openxmlformats.org/officeDocument/2006/customXml" ds:itemID="{91D4C477-4CBF-4833-A763-167B6759CA65}">
-  <ds:schemaRefs/>
-</ds:datastoreItem>
-</file>
-
-<file path=customXml/itemProps6.xml><?xml version="1.0" encoding="utf-8"?>
-<ds:datastoreItem xmlns:ds="http://schemas.openxmlformats.org/officeDocument/2006/customXml" ds:itemID="{C1422F45-04DB-421D-8796-270006657806}">
-  <ds:schemaRefs>
-    <ds:schemaRef ds:uri="http://schemas.microsoft.com/office/2006/metadata/properties"/>
-    <ds:schemaRef ds:uri="http://purl.org/dc/terms/"/>
-    <ds:schemaRef ds:uri="http://schemas.openxmlformats.org/package/2006/metadata/core-properties"/>
-    <ds:schemaRef ds:uri="0e00d59e-b0d2-4e67-be34-67e465b0fbed"/>
-    <ds:schemaRef ds:uri="http://schemas.microsoft.com/office/2006/documentManagement/types"/>
-    <ds:schemaRef ds:uri="http://schemas.microsoft.com/office/infopath/2007/PartnerControls"/>
-    <ds:schemaRef ds:uri="http://purl.org/dc/elements/1.1/"/>
-    <ds:schemaRef ds:uri="47fc58d8-9f4b-4bc8-b278-c3cb6f298023"/>
-    <ds:schemaRef ds:uri="http://www.w3.org/XML/1998/namespace"/>
-    <ds:schemaRef ds:uri="http://purl.org/dc/dcmitype/"/>
-  </ds:schemaRefs>
-</ds:datastoreItem>
-</file>
-
-<file path=customXml/itemProps7.xml><?xml version="1.0" encoding="utf-8"?>
-<ds:datastoreItem xmlns:ds="http://schemas.openxmlformats.org/officeDocument/2006/customXml" ds:itemID="{626BBCBB-1894-4E66-BA48-9E91CE3ACBA0}">
+<file path=customXml/itemProps9.xml><?xml version="1.0" encoding="utf-8"?>
+<ds:datastoreItem xmlns:ds="http://schemas.openxmlformats.org/officeDocument/2006/customXml" ds:itemID="{85ED5BCC-CA3F-46CE-8B2C-50A9E47A9179}">
   <ds:schemaRefs/>
 </ds:datastoreItem>
 </file>
</xml_diff>